<commit_message>
icfp14: change colors in smaccmpilot arch diagram
</commit_message>
<xml_diff>
--- a/figures/smaccmpilot-diagram-jan14.pptx
+++ b/figures/smaccmpilot-diagram-jan14.pptx
@@ -3088,9 +3088,7 @@
               <a:avLst/>
             </a:prstGeom>
             <a:solidFill>
-              <a:sysClr val="window" lastClr="FFFFFF">
-                <a:lumMod val="85000"/>
-              </a:sysClr>
+              <a:schemeClr val="bg1"/>
             </a:solidFill>
             <a:ln w="25400" cap="flat" cmpd="sng" algn="ctr">
               <a:solidFill>
@@ -3233,7 +3231,9 @@
               <a:avLst/>
             </a:prstGeom>
             <a:solidFill>
-              <a:schemeClr val="bg1"/>
+              <a:schemeClr val="bg1">
+                <a:lumMod val="85000"/>
+              </a:schemeClr>
             </a:solidFill>
             <a:ln w="25400" cap="flat" cmpd="sng" algn="ctr">
               <a:solidFill>
@@ -3429,7 +3429,9 @@
               <a:avLst/>
             </a:prstGeom>
             <a:solidFill>
-              <a:schemeClr val="bg1"/>
+              <a:schemeClr val="bg1">
+                <a:lumMod val="85000"/>
+              </a:schemeClr>
             </a:solidFill>
             <a:ln w="25400" cap="flat" cmpd="sng" algn="ctr">
               <a:solidFill>
@@ -3615,7 +3617,9 @@
               <a:avLst/>
             </a:prstGeom>
             <a:solidFill>
-              <a:schemeClr val="bg1"/>
+              <a:schemeClr val="bg1">
+                <a:lumMod val="85000"/>
+              </a:schemeClr>
             </a:solidFill>
             <a:ln w="25400" cap="flat" cmpd="sng" algn="ctr">
               <a:solidFill>

</xml_diff>